<commit_message>
Presentation readability improvements based on practise presenting.
</commit_message>
<xml_diff>
--- a/Presentation.pptx
+++ b/Presentation.pptx
@@ -267,7 +267,7 @@
           <a:p>
             <a:fld id="{6A5540B2-652F-4A41-9C7B-AA8B5C9F5541}" type="datetimeFigureOut">
               <a:rPr lang="en-GB" smtClean="0"/>
-              <a:t>26/02/2018</a:t>
+              <a:t>27/02/2018</a:t>
             </a:fld>
             <a:endParaRPr lang="en-GB"/>
           </a:p>
@@ -1123,6 +1123,90 @@
 </p:notes>
 </file>
 
+<file path=ppt/notesSlides/notesSlide8.xml><?xml version="1.0" encoding="utf-8"?>
+<p:notes xmlns:a="http://schemas.openxmlformats.org/drawingml/2006/main" xmlns:r="http://schemas.openxmlformats.org/officeDocument/2006/relationships" xmlns:p="http://schemas.openxmlformats.org/presentationml/2006/main">
+  <p:cSld>
+    <p:spTree>
+      <p:nvGrpSpPr>
+        <p:cNvPr id="1" name=""/>
+        <p:cNvGrpSpPr/>
+        <p:nvPr/>
+      </p:nvGrpSpPr>
+      <p:grpSpPr>
+        <a:xfrm>
+          <a:off x="0" y="0"/>
+          <a:ext cx="0" cy="0"/>
+          <a:chOff x="0" y="0"/>
+          <a:chExt cx="0" cy="0"/>
+        </a:xfrm>
+      </p:grpSpPr>
+      <p:sp>
+        <p:nvSpPr>
+          <p:cNvPr id="2" name="Slide Image Placeholder 1"/>
+          <p:cNvSpPr>
+            <a:spLocks noGrp="1" noRot="1" noChangeAspect="1"/>
+          </p:cNvSpPr>
+          <p:nvPr>
+            <p:ph type="sldImg"/>
+          </p:nvPr>
+        </p:nvSpPr>
+        <p:spPr/>
+      </p:sp>
+      <p:sp>
+        <p:nvSpPr>
+          <p:cNvPr id="3" name="Notes Placeholder 2"/>
+          <p:cNvSpPr>
+            <a:spLocks noGrp="1"/>
+          </p:cNvSpPr>
+          <p:nvPr>
+            <p:ph type="body" idx="1"/>
+          </p:nvPr>
+        </p:nvSpPr>
+        <p:spPr/>
+        <p:txBody>
+          <a:bodyPr/>
+          <a:lstStyle/>
+          <a:p>
+            <a:endParaRPr lang="en-GB"/>
+          </a:p>
+        </p:txBody>
+      </p:sp>
+      <p:sp>
+        <p:nvSpPr>
+          <p:cNvPr id="4" name="Slide Number Placeholder 3"/>
+          <p:cNvSpPr>
+            <a:spLocks noGrp="1"/>
+          </p:cNvSpPr>
+          <p:nvPr>
+            <p:ph type="sldNum" sz="quarter" idx="10"/>
+          </p:nvPr>
+        </p:nvSpPr>
+        <p:spPr/>
+        <p:txBody>
+          <a:bodyPr/>
+          <a:lstStyle/>
+          <a:p>
+            <a:fld id="{D8D247D5-E5FD-4D98-9008-338DDEB6C507}" type="slidenum">
+              <a:rPr lang="en-GB" smtClean="0"/>
+              <a:t>28</a:t>
+            </a:fld>
+            <a:endParaRPr lang="en-GB"/>
+          </a:p>
+        </p:txBody>
+      </p:sp>
+    </p:spTree>
+    <p:extLst>
+      <p:ext uri="{BB962C8B-B14F-4D97-AF65-F5344CB8AC3E}">
+        <p14:creationId xmlns:p14="http://schemas.microsoft.com/office/powerpoint/2010/main" val="4251042205"/>
+      </p:ext>
+    </p:extLst>
+  </p:cSld>
+  <p:clrMapOvr>
+    <a:masterClrMapping/>
+  </p:clrMapOvr>
+</p:notes>
+</file>
+
 <file path=ppt/slideLayouts/slideLayout1.xml><?xml version="1.0" encoding="utf-8"?>
 <p:sldLayout xmlns:a="http://schemas.openxmlformats.org/drawingml/2006/main" xmlns:r="http://schemas.openxmlformats.org/officeDocument/2006/relationships" xmlns:p="http://schemas.openxmlformats.org/presentationml/2006/main" showMasterSp="0" type="title" preserve="1">
   <p:cSld name="Title Slide">
@@ -1292,7 +1376,7 @@
           <a:p>
             <a:fld id="{7755CC85-1475-4064-B921-9EA614CEF79B}" type="datetimeFigureOut">
               <a:rPr lang="en-GB" smtClean="0"/>
-              <a:t>26/02/2018</a:t>
+              <a:t>27/02/2018</a:t>
             </a:fld>
             <a:endParaRPr lang="en-GB"/>
           </a:p>
@@ -1622,7 +1706,7 @@
           <a:p>
             <a:fld id="{7755CC85-1475-4064-B921-9EA614CEF79B}" type="datetimeFigureOut">
               <a:rPr lang="en-GB" smtClean="0"/>
-              <a:t>26/02/2018</a:t>
+              <a:t>27/02/2018</a:t>
             </a:fld>
             <a:endParaRPr lang="en-GB"/>
           </a:p>
@@ -1802,7 +1886,7 @@
           <a:p>
             <a:fld id="{7755CC85-1475-4064-B921-9EA614CEF79B}" type="datetimeFigureOut">
               <a:rPr lang="en-GB" smtClean="0"/>
-              <a:t>26/02/2018</a:t>
+              <a:t>27/02/2018</a:t>
             </a:fld>
             <a:endParaRPr lang="en-GB"/>
           </a:p>
@@ -1972,7 +2056,7 @@
           <a:p>
             <a:fld id="{7755CC85-1475-4064-B921-9EA614CEF79B}" type="datetimeFigureOut">
               <a:rPr lang="en-GB" smtClean="0"/>
-              <a:t>26/02/2018</a:t>
+              <a:t>27/02/2018</a:t>
             </a:fld>
             <a:endParaRPr lang="en-GB"/>
           </a:p>
@@ -2249,7 +2333,7 @@
           <a:p>
             <a:fld id="{7755CC85-1475-4064-B921-9EA614CEF79B}" type="datetimeFigureOut">
               <a:rPr lang="en-GB" smtClean="0"/>
-              <a:t>26/02/2018</a:t>
+              <a:t>27/02/2018</a:t>
             </a:fld>
             <a:endParaRPr lang="en-GB"/>
           </a:p>
@@ -2643,7 +2727,7 @@
           <a:p>
             <a:fld id="{7755CC85-1475-4064-B921-9EA614CEF79B}" type="datetimeFigureOut">
               <a:rPr lang="en-GB" smtClean="0"/>
-              <a:t>26/02/2018</a:t>
+              <a:t>27/02/2018</a:t>
             </a:fld>
             <a:endParaRPr lang="en-GB"/>
           </a:p>
@@ -3120,7 +3204,7 @@
           <a:p>
             <a:fld id="{7755CC85-1475-4064-B921-9EA614CEF79B}" type="datetimeFigureOut">
               <a:rPr lang="en-GB" smtClean="0"/>
-              <a:t>26/02/2018</a:t>
+              <a:t>27/02/2018</a:t>
             </a:fld>
             <a:endParaRPr lang="en-GB"/>
           </a:p>
@@ -3238,7 +3322,7 @@
           <a:p>
             <a:fld id="{7755CC85-1475-4064-B921-9EA614CEF79B}" type="datetimeFigureOut">
               <a:rPr lang="en-GB" smtClean="0"/>
-              <a:t>26/02/2018</a:t>
+              <a:t>27/02/2018</a:t>
             </a:fld>
             <a:endParaRPr lang="en-GB"/>
           </a:p>
@@ -3333,7 +3417,7 @@
           <a:p>
             <a:fld id="{7755CC85-1475-4064-B921-9EA614CEF79B}" type="datetimeFigureOut">
               <a:rPr lang="en-GB" smtClean="0"/>
-              <a:t>26/02/2018</a:t>
+              <a:t>27/02/2018</a:t>
             </a:fld>
             <a:endParaRPr lang="en-GB"/>
           </a:p>
@@ -3679,7 +3763,7 @@
           <a:p>
             <a:fld id="{7755CC85-1475-4064-B921-9EA614CEF79B}" type="datetimeFigureOut">
               <a:rPr lang="en-GB" smtClean="0"/>
-              <a:t>26/02/2018</a:t>
+              <a:t>27/02/2018</a:t>
             </a:fld>
             <a:endParaRPr lang="en-GB"/>
           </a:p>
@@ -4067,7 +4151,7 @@
           <a:p>
             <a:fld id="{7755CC85-1475-4064-B921-9EA614CEF79B}" type="datetimeFigureOut">
               <a:rPr lang="en-GB" smtClean="0"/>
-              <a:t>26/02/2018</a:t>
+              <a:t>27/02/2018</a:t>
             </a:fld>
             <a:endParaRPr lang="en-GB"/>
           </a:p>
@@ -4345,7 +4429,7 @@
           <a:p>
             <a:fld id="{7755CC85-1475-4064-B921-9EA614CEF79B}" type="datetimeFigureOut">
               <a:rPr lang="en-GB" smtClean="0"/>
-              <a:t>26/02/2018</a:t>
+              <a:t>27/02/2018</a:t>
             </a:fld>
             <a:endParaRPr lang="en-GB"/>
           </a:p>
@@ -5527,41 +5611,69 @@
           </a:p>
         </p:txBody>
       </p:sp>
-      <p:pic>
-        <p:nvPicPr>
-          <p:cNvPr id="9" name="Picture 8">
+      <p:graphicFrame>
+        <p:nvGraphicFramePr>
+          <p:cNvPr id="6" name="Object 5">
             <a:extLst>
               <a:ext uri="{FF2B5EF4-FFF2-40B4-BE49-F238E27FC236}">
-                <a16:creationId xmlns:a16="http://schemas.microsoft.com/office/drawing/2014/main" id="{825FD9C7-B247-4304-8818-546F57E613D8}"/>
+                <a16:creationId xmlns:a16="http://schemas.microsoft.com/office/drawing/2014/main" id="{7209CB35-A187-4C74-BE93-646B79B765DE}"/>
               </a:ext>
             </a:extLst>
           </p:cNvPr>
-          <p:cNvPicPr>
-            <a:picLocks noChangeAspect="1"/>
-          </p:cNvPicPr>
-          <p:nvPr/>
-        </p:nvPicPr>
-        <p:blipFill rotWithShape="1">
-          <a:blip r:embed="rId2">
-            <a:extLst>
-              <a:ext uri="{28A0092B-C50C-407E-A947-70E740481C1C}">
-                <a14:useLocalDpi xmlns:a14="http://schemas.microsoft.com/office/drawing/2010/main" val="0"/>
-              </a:ext>
-            </a:extLst>
-          </a:blip>
-          <a:srcRect t="6022"/>
-          <a:stretch/>
-        </p:blipFill>
-        <p:spPr>
-          <a:xfrm>
-            <a:off x="7210015" y="1274883"/>
-            <a:ext cx="4238202" cy="4221041"/>
-          </a:xfrm>
-          <a:prstGeom prst="rect">
-            <a:avLst/>
-          </a:prstGeom>
-        </p:spPr>
-      </p:pic>
+          <p:cNvGraphicFramePr>
+            <a:graphicFrameLocks noChangeAspect="1"/>
+          </p:cNvGraphicFramePr>
+          <p:nvPr>
+            <p:extLst>
+              <p:ext uri="{D42A27DB-BD31-4B8C-83A1-F6EECF244321}">
+                <p14:modId xmlns:p14="http://schemas.microsoft.com/office/powerpoint/2010/main" val="2492537745"/>
+              </p:ext>
+            </p:extLst>
+          </p:nvPr>
+        </p:nvGraphicFramePr>
+        <p:xfrm>
+          <a:off x="7515605" y="1274884"/>
+          <a:ext cx="3627022" cy="4189104"/>
+        </p:xfrm>
+        <a:graphic>
+          <a:graphicData uri="http://schemas.openxmlformats.org/presentationml/2006/ole">
+            <mc:AlternateContent xmlns:mc="http://schemas.openxmlformats.org/markup-compatibility/2006">
+              <mc:Choice xmlns:v="urn:schemas-microsoft-com:vml" Requires="v">
+                <p:oleObj spid="_x0000_s1031" name="Image" r:id="rId3" imgW="3258000" imgH="3762720" progId="Photoshop.Image.13">
+                  <p:embed/>
+                </p:oleObj>
+              </mc:Choice>
+              <mc:Fallback>
+                <p:oleObj name="Image" r:id="rId3" imgW="3258000" imgH="3762720" progId="Photoshop.Image.13">
+                  <p:embed/>
+                  <p:pic>
+                    <p:nvPicPr>
+                      <p:cNvPr id="0" name=""/>
+                      <p:cNvPicPr/>
+                      <p:nvPr/>
+                    </p:nvPicPr>
+                    <p:blipFill>
+                      <a:blip r:embed="rId4"/>
+                      <a:stretch>
+                        <a:fillRect/>
+                      </a:stretch>
+                    </p:blipFill>
+                    <p:spPr>
+                      <a:xfrm>
+                        <a:off x="7515605" y="1274884"/>
+                        <a:ext cx="3627022" cy="4189104"/>
+                      </a:xfrm>
+                      <a:prstGeom prst="rect">
+                        <a:avLst/>
+                      </a:prstGeom>
+                    </p:spPr>
+                  </p:pic>
+                </p:oleObj>
+              </mc:Fallback>
+            </mc:AlternateContent>
+          </a:graphicData>
+        </a:graphic>
+      </p:graphicFrame>
     </p:spTree>
     <p:extLst>
       <p:ext uri="{BB962C8B-B14F-4D97-AF65-F5344CB8AC3E}">
@@ -5947,7 +6059,7 @@
         <p:spPr>
           <a:xfrm>
             <a:off x="879231" y="1274884"/>
-            <a:ext cx="5873994" cy="3954341"/>
+            <a:ext cx="4980393" cy="3954341"/>
           </a:xfrm>
           <a:prstGeom prst="rect">
             <a:avLst/>
@@ -5960,7 +6072,7 @@
         </p:spPr>
         <p:txBody>
           <a:bodyPr vert="horz" lIns="91440" tIns="45720" rIns="91440" bIns="45720" rtlCol="0">
-            <a:normAutofit lnSpcReduction="10000"/>
+            <a:normAutofit/>
           </a:bodyPr>
           <a:lstStyle>
             <a:lvl1pPr marL="384048" indent="-384048" algn="l" defTabSz="914400" rtl="0" eaLnBrk="1" latinLnBrk="0" hangingPunct="1">
@@ -6156,15 +6268,7 @@
           <a:p>
             <a:r>
               <a:rPr lang="en-GB" dirty="0"/>
-              <a:t>"It is reasonable that roads in a higher populated area should be also denser to alleviate the traffic flow burden and people everywhere should have easy </a:t>
-            </a:r>
-            <a:r>
-              <a:rPr lang="en-GB" dirty="0" err="1"/>
-              <a:t>acess</a:t>
-            </a:r>
-            <a:r>
-              <a:rPr lang="en-GB" dirty="0"/>
-              <a:t> to the road. Taking these tw3o aspects into consideration, we use </a:t>
+              <a:t>Higher populated areas should have a denser road populate to alleviate traffic flow, we therefore use a </a:t>
             </a:r>
             <a:r>
               <a:rPr lang="en-GB" dirty="0" err="1"/>
@@ -6172,7 +6276,14 @@
             </a:r>
             <a:r>
               <a:rPr lang="en-GB" dirty="0"/>
-              <a:t> diagram as the rule of population-based template" (Sun, J. Yu, X. </a:t>
+              <a:t> diagram as the template.</a:t>
+            </a:r>
+            <a:br>
+              <a:rPr lang="en-GB" dirty="0"/>
+            </a:br>
+            <a:r>
+              <a:rPr lang="en-GB" dirty="0"/>
+              <a:t>(Sun, J. Yu, X. </a:t>
             </a:r>
             <a:r>
               <a:rPr lang="en-GB" dirty="0" err="1"/>
@@ -6205,7 +6316,14 @@
             </a:r>
             <a:r>
               <a:rPr lang="en-GB" dirty="0"/>
-              <a:t> edges we get are the resulting roads." (Sun, J. Yu, X. </a:t>
+              <a:t> edges we get are the resulting roads." </a:t>
+            </a:r>
+            <a:br>
+              <a:rPr lang="en-GB" dirty="0"/>
+            </a:br>
+            <a:r>
+              <a:rPr lang="en-GB" dirty="0"/>
+              <a:t>(Sun, J. Yu, X. </a:t>
             </a:r>
             <a:r>
               <a:rPr lang="en-GB" dirty="0" err="1"/>
@@ -6218,41 +6336,69 @@
           </a:p>
         </p:txBody>
       </p:sp>
-      <p:pic>
-        <p:nvPicPr>
-          <p:cNvPr id="9" name="Picture 8">
+      <p:graphicFrame>
+        <p:nvGraphicFramePr>
+          <p:cNvPr id="10" name="Object 9">
             <a:extLst>
               <a:ext uri="{FF2B5EF4-FFF2-40B4-BE49-F238E27FC236}">
-                <a16:creationId xmlns:a16="http://schemas.microsoft.com/office/drawing/2014/main" id="{163BA30C-CA1F-4E06-84A0-1DED64D46C52}"/>
+                <a16:creationId xmlns:a16="http://schemas.microsoft.com/office/drawing/2014/main" id="{F85EFF29-EC68-4DA3-8209-7C6A7C6BACD6}"/>
               </a:ext>
             </a:extLst>
           </p:cNvPr>
-          <p:cNvPicPr>
-            <a:picLocks noChangeAspect="1"/>
-          </p:cNvPicPr>
-          <p:nvPr/>
-        </p:nvPicPr>
-        <p:blipFill rotWithShape="1">
-          <a:blip r:embed="rId2">
-            <a:extLst>
-              <a:ext uri="{28A0092B-C50C-407E-A947-70E740481C1C}">
-                <a14:useLocalDpi xmlns:a14="http://schemas.microsoft.com/office/drawing/2010/main" val="0"/>
-              </a:ext>
-            </a:extLst>
-          </a:blip>
-          <a:srcRect t="4102"/>
-          <a:stretch/>
-        </p:blipFill>
-        <p:spPr>
-          <a:xfrm>
-            <a:off x="6941594" y="1966180"/>
-            <a:ext cx="4775043" cy="2686050"/>
-          </a:xfrm>
-          <a:prstGeom prst="rect">
-            <a:avLst/>
-          </a:prstGeom>
-        </p:spPr>
-      </p:pic>
+          <p:cNvGraphicFramePr>
+            <a:graphicFrameLocks noChangeAspect="1"/>
+          </p:cNvGraphicFramePr>
+          <p:nvPr>
+            <p:extLst>
+              <p:ext uri="{D42A27DB-BD31-4B8C-83A1-F6EECF244321}">
+                <p14:modId xmlns:p14="http://schemas.microsoft.com/office/powerpoint/2010/main" val="2342997078"/>
+              </p:ext>
+            </p:extLst>
+          </p:nvPr>
+        </p:nvGraphicFramePr>
+        <p:xfrm>
+          <a:off x="5939938" y="1656996"/>
+          <a:ext cx="5965069" cy="3199005"/>
+        </p:xfrm>
+        <a:graphic>
+          <a:graphicData uri="http://schemas.openxmlformats.org/presentationml/2006/ole">
+            <mc:AlternateContent xmlns:mc="http://schemas.openxmlformats.org/markup-compatibility/2006">
+              <mc:Choice xmlns:v="urn:schemas-microsoft-com:vml" Requires="v">
+                <p:oleObj spid="_x0000_s2056" name="Image" r:id="rId3" imgW="9164160" imgH="4915440" progId="Photoshop.Image.13">
+                  <p:embed/>
+                </p:oleObj>
+              </mc:Choice>
+              <mc:Fallback>
+                <p:oleObj name="Image" r:id="rId3" imgW="9164160" imgH="4915440" progId="Photoshop.Image.13">
+                  <p:embed/>
+                  <p:pic>
+                    <p:nvPicPr>
+                      <p:cNvPr id="0" name=""/>
+                      <p:cNvPicPr/>
+                      <p:nvPr/>
+                    </p:nvPicPr>
+                    <p:blipFill>
+                      <a:blip r:embed="rId4"/>
+                      <a:stretch>
+                        <a:fillRect/>
+                      </a:stretch>
+                    </p:blipFill>
+                    <p:spPr>
+                      <a:xfrm>
+                        <a:off x="5939938" y="1656996"/>
+                        <a:ext cx="5965069" cy="3199005"/>
+                      </a:xfrm>
+                      <a:prstGeom prst="rect">
+                        <a:avLst/>
+                      </a:prstGeom>
+                    </p:spPr>
+                  </p:pic>
+                </p:oleObj>
+              </mc:Fallback>
+            </mc:AlternateContent>
+          </a:graphicData>
+        </a:graphic>
+      </p:graphicFrame>
     </p:spTree>
     <p:extLst>
       <p:ext uri="{BB962C8B-B14F-4D97-AF65-F5344CB8AC3E}">
@@ -11143,15 +11289,15 @@
       </p:sp>
       <p:pic>
         <p:nvPicPr>
-          <p:cNvPr id="9" name="Picture 8">
+          <p:cNvPr id="3076" name="Picture 4" descr="https://josephbarberfinalproject.files.wordpress.com/2018/02/2.png?w=1000&amp;h=">
             <a:extLst>
               <a:ext uri="{FF2B5EF4-FFF2-40B4-BE49-F238E27FC236}">
-                <a16:creationId xmlns:a16="http://schemas.microsoft.com/office/drawing/2014/main" id="{E8379413-37A0-4A14-BB9F-2A132C750A1C}"/>
+                <a16:creationId xmlns:a16="http://schemas.microsoft.com/office/drawing/2014/main" id="{79B88B27-2E70-40B0-90CA-8E0C2C2A1D85}"/>
               </a:ext>
             </a:extLst>
           </p:cNvPr>
           <p:cNvPicPr>
-            <a:picLocks noChangeAspect="1"/>
+            <a:picLocks noChangeAspect="1" noChangeArrowheads="1"/>
           </p:cNvPicPr>
           <p:nvPr/>
         </p:nvPicPr>
@@ -11163,17 +11309,27 @@
               </a:ext>
             </a:extLst>
           </a:blip>
-          <a:srcRect t="6084"/>
+          <a:srcRect t="6153"/>
           <a:stretch/>
         </p:blipFill>
-        <p:spPr>
+        <p:spPr bwMode="auto">
           <a:xfrm>
-            <a:off x="7346438" y="1274884"/>
-            <a:ext cx="3965356" cy="3941466"/>
+            <a:off x="7329964" y="1274884"/>
+            <a:ext cx="3998303" cy="3971315"/>
           </a:xfrm>
           <a:prstGeom prst="rect">
             <a:avLst/>
           </a:prstGeom>
+          <a:noFill/>
+          <a:extLst>
+            <a:ext uri="{909E8E84-426E-40DD-AFC4-6F175D3DCCD1}">
+              <a14:hiddenFill xmlns:a14="http://schemas.microsoft.com/office/drawing/2010/main">
+                <a:solidFill>
+                  <a:srgbClr val="FFFFFF"/>
+                </a:solidFill>
+              </a14:hiddenFill>
+            </a:ext>
+          </a:extLst>
         </p:spPr>
       </p:pic>
     </p:spTree>
@@ -11241,41 +11397,6 @@
           </a:p>
         </p:txBody>
       </p:sp>
-      <p:pic>
-        <p:nvPicPr>
-          <p:cNvPr id="5" name="Picture 4">
-            <a:extLst>
-              <a:ext uri="{FF2B5EF4-FFF2-40B4-BE49-F238E27FC236}">
-                <a16:creationId xmlns:a16="http://schemas.microsoft.com/office/drawing/2014/main" id="{A9003B43-C777-490B-B820-E2E685FBDA79}"/>
-              </a:ext>
-            </a:extLst>
-          </p:cNvPr>
-          <p:cNvPicPr>
-            <a:picLocks noChangeAspect="1"/>
-          </p:cNvPicPr>
-          <p:nvPr/>
-        </p:nvPicPr>
-        <p:blipFill rotWithShape="1">
-          <a:blip r:embed="rId2">
-            <a:extLst>
-              <a:ext uri="{28A0092B-C50C-407E-A947-70E740481C1C}">
-                <a14:useLocalDpi xmlns:a14="http://schemas.microsoft.com/office/drawing/2010/main" val="0"/>
-              </a:ext>
-            </a:extLst>
-          </a:blip>
-          <a:srcRect t="5727"/>
-          <a:stretch/>
-        </p:blipFill>
-        <p:spPr>
-          <a:xfrm>
-            <a:off x="1261075" y="1274885"/>
-            <a:ext cx="5131044" cy="5119526"/>
-          </a:xfrm>
-          <a:prstGeom prst="rect">
-            <a:avLst/>
-          </a:prstGeom>
-        </p:spPr>
-      </p:pic>
       <p:pic>
         <p:nvPicPr>
           <p:cNvPr id="8" name="Picture 7">
@@ -11347,6 +11468,69 @@
           </a:prstGeom>
         </p:spPr>
       </p:pic>
+      <p:graphicFrame>
+        <p:nvGraphicFramePr>
+          <p:cNvPr id="3" name="Object 2">
+            <a:extLst>
+              <a:ext uri="{FF2B5EF4-FFF2-40B4-BE49-F238E27FC236}">
+                <a16:creationId xmlns:a16="http://schemas.microsoft.com/office/drawing/2014/main" id="{153AFC97-DDD7-4CF1-8FF1-479DFC041363}"/>
+              </a:ext>
+            </a:extLst>
+          </p:cNvPr>
+          <p:cNvGraphicFramePr>
+            <a:graphicFrameLocks noChangeAspect="1"/>
+          </p:cNvGraphicFramePr>
+          <p:nvPr>
+            <p:extLst>
+              <p:ext uri="{D42A27DB-BD31-4B8C-83A1-F6EECF244321}">
+                <p14:modId xmlns:p14="http://schemas.microsoft.com/office/powerpoint/2010/main" val="2939118264"/>
+              </p:ext>
+            </p:extLst>
+          </p:nvPr>
+        </p:nvGraphicFramePr>
+        <p:xfrm>
+          <a:off x="1546831" y="1274885"/>
+          <a:ext cx="5015045" cy="5033939"/>
+        </p:xfrm>
+        <a:graphic>
+          <a:graphicData uri="http://schemas.openxmlformats.org/presentationml/2006/ole">
+            <mc:AlternateContent xmlns:mc="http://schemas.openxmlformats.org/markup-compatibility/2006">
+              <mc:Choice xmlns:v="urn:schemas-microsoft-com:vml" Requires="v">
+                <p:oleObj spid="_x0000_s4103" name="Image" r:id="rId5" imgW="6742800" imgH="6768000" progId="Photoshop.Image.13">
+                  <p:embed/>
+                </p:oleObj>
+              </mc:Choice>
+              <mc:Fallback>
+                <p:oleObj name="Image" r:id="rId5" imgW="6742800" imgH="6768000" progId="Photoshop.Image.13">
+                  <p:embed/>
+                  <p:pic>
+                    <p:nvPicPr>
+                      <p:cNvPr id="0" name=""/>
+                      <p:cNvPicPr/>
+                      <p:nvPr/>
+                    </p:nvPicPr>
+                    <p:blipFill>
+                      <a:blip r:embed="rId6"/>
+                      <a:stretch>
+                        <a:fillRect/>
+                      </a:stretch>
+                    </p:blipFill>
+                    <p:spPr>
+                      <a:xfrm>
+                        <a:off x="1546831" y="1274885"/>
+                        <a:ext cx="5015045" cy="5033939"/>
+                      </a:xfrm>
+                      <a:prstGeom prst="rect">
+                        <a:avLst/>
+                      </a:prstGeom>
+                    </p:spPr>
+                  </p:pic>
+                </p:oleObj>
+              </mc:Fallback>
+            </mc:AlternateContent>
+          </a:graphicData>
+        </a:graphic>
+      </p:graphicFrame>
     </p:spTree>
     <p:extLst>
       <p:ext uri="{BB962C8B-B14F-4D97-AF65-F5344CB8AC3E}">
@@ -11412,41 +11596,69 @@
           </a:p>
         </p:txBody>
       </p:sp>
-      <p:pic>
-        <p:nvPicPr>
-          <p:cNvPr id="4" name="Picture 3">
+      <p:graphicFrame>
+        <p:nvGraphicFramePr>
+          <p:cNvPr id="3" name="Object 2">
             <a:extLst>
               <a:ext uri="{FF2B5EF4-FFF2-40B4-BE49-F238E27FC236}">
-                <a16:creationId xmlns:a16="http://schemas.microsoft.com/office/drawing/2014/main" id="{132354E3-93DE-40E2-8E67-AF9C751829D3}"/>
+                <a16:creationId xmlns:a16="http://schemas.microsoft.com/office/drawing/2014/main" id="{080E8002-1FE3-45DD-91D6-2A31AA2B4FF1}"/>
               </a:ext>
             </a:extLst>
           </p:cNvPr>
-          <p:cNvPicPr>
-            <a:picLocks noChangeAspect="1"/>
-          </p:cNvPicPr>
-          <p:nvPr/>
-        </p:nvPicPr>
-        <p:blipFill rotWithShape="1">
-          <a:blip r:embed="rId2">
-            <a:extLst>
-              <a:ext uri="{28A0092B-C50C-407E-A947-70E740481C1C}">
-                <a14:useLocalDpi xmlns:a14="http://schemas.microsoft.com/office/drawing/2010/main" val="0"/>
-              </a:ext>
-            </a:extLst>
-          </a:blip>
-          <a:srcRect l="5077" t="11964" r="6244" b="5901"/>
-          <a:stretch/>
-        </p:blipFill>
-        <p:spPr>
-          <a:xfrm>
-            <a:off x="3667969" y="1274885"/>
-            <a:ext cx="5448300" cy="5340768"/>
-          </a:xfrm>
-          <a:prstGeom prst="rect">
-            <a:avLst/>
-          </a:prstGeom>
-        </p:spPr>
-      </p:pic>
+          <p:cNvGraphicFramePr>
+            <a:graphicFrameLocks noChangeAspect="1"/>
+          </p:cNvGraphicFramePr>
+          <p:nvPr>
+            <p:extLst>
+              <p:ext uri="{D42A27DB-BD31-4B8C-83A1-F6EECF244321}">
+                <p14:modId xmlns:p14="http://schemas.microsoft.com/office/powerpoint/2010/main" val="325446853"/>
+              </p:ext>
+            </p:extLst>
+          </p:nvPr>
+        </p:nvGraphicFramePr>
+        <p:xfrm>
+          <a:off x="3484612" y="1010427"/>
+          <a:ext cx="5815013" cy="5676900"/>
+        </p:xfrm>
+        <a:graphic>
+          <a:graphicData uri="http://schemas.openxmlformats.org/presentationml/2006/ole">
+            <mc:AlternateContent xmlns:mc="http://schemas.openxmlformats.org/markup-compatibility/2006">
+              <mc:Choice xmlns:v="urn:schemas-microsoft-com:vml" Requires="v">
+                <p:oleObj spid="_x0000_s5127" name="Image" r:id="rId3" imgW="5815800" imgH="5676120" progId="Photoshop.Image.13">
+                  <p:embed/>
+                </p:oleObj>
+              </mc:Choice>
+              <mc:Fallback>
+                <p:oleObj name="Image" r:id="rId3" imgW="5815800" imgH="5676120" progId="Photoshop.Image.13">
+                  <p:embed/>
+                  <p:pic>
+                    <p:nvPicPr>
+                      <p:cNvPr id="0" name=""/>
+                      <p:cNvPicPr/>
+                      <p:nvPr/>
+                    </p:nvPicPr>
+                    <p:blipFill>
+                      <a:blip r:embed="rId4"/>
+                      <a:stretch>
+                        <a:fillRect/>
+                      </a:stretch>
+                    </p:blipFill>
+                    <p:spPr>
+                      <a:xfrm>
+                        <a:off x="3484612" y="1010427"/>
+                        <a:ext cx="5815013" cy="5676900"/>
+                      </a:xfrm>
+                      <a:prstGeom prst="rect">
+                        <a:avLst/>
+                      </a:prstGeom>
+                    </p:spPr>
+                  </p:pic>
+                </p:oleObj>
+              </mc:Fallback>
+            </mc:AlternateContent>
+          </a:graphicData>
+        </a:graphic>
+      </p:graphicFrame>
     </p:spTree>
     <p:extLst>
       <p:ext uri="{BB962C8B-B14F-4D97-AF65-F5344CB8AC3E}">
@@ -12853,41 +13065,69 @@
           </a:p>
         </p:txBody>
       </p:sp>
-      <p:pic>
-        <p:nvPicPr>
-          <p:cNvPr id="9" name="Picture 8">
+      <p:graphicFrame>
+        <p:nvGraphicFramePr>
+          <p:cNvPr id="5" name="Object 4">
             <a:extLst>
               <a:ext uri="{FF2B5EF4-FFF2-40B4-BE49-F238E27FC236}">
-                <a16:creationId xmlns:a16="http://schemas.microsoft.com/office/drawing/2014/main" id="{6F867BA4-82BF-46F4-B15A-0865D25399C0}"/>
+                <a16:creationId xmlns:a16="http://schemas.microsoft.com/office/drawing/2014/main" id="{B009526B-2469-4FC6-9F13-38BEBBD8A636}"/>
               </a:ext>
             </a:extLst>
           </p:cNvPr>
-          <p:cNvPicPr>
-            <a:picLocks noChangeAspect="1"/>
-          </p:cNvPicPr>
-          <p:nvPr/>
-        </p:nvPicPr>
-        <p:blipFill rotWithShape="1">
-          <a:blip r:embed="rId3">
-            <a:extLst>
-              <a:ext uri="{28A0092B-C50C-407E-A947-70E740481C1C}">
-                <a14:useLocalDpi xmlns:a14="http://schemas.microsoft.com/office/drawing/2010/main" val="0"/>
-              </a:ext>
-            </a:extLst>
-          </a:blip>
-          <a:srcRect l="8771" t="18050" r="26895" b="25567"/>
-          <a:stretch/>
-        </p:blipFill>
-        <p:spPr>
-          <a:xfrm>
-            <a:off x="7343153" y="1402745"/>
-            <a:ext cx="3971925" cy="3689094"/>
-          </a:xfrm>
-          <a:prstGeom prst="rect">
-            <a:avLst/>
-          </a:prstGeom>
-        </p:spPr>
-      </p:pic>
+          <p:cNvGraphicFramePr>
+            <a:graphicFrameLocks noChangeAspect="1"/>
+          </p:cNvGraphicFramePr>
+          <p:nvPr>
+            <p:extLst>
+              <p:ext uri="{D42A27DB-BD31-4B8C-83A1-F6EECF244321}">
+                <p14:modId xmlns:p14="http://schemas.microsoft.com/office/powerpoint/2010/main" val="972367906"/>
+              </p:ext>
+            </p:extLst>
+          </p:nvPr>
+        </p:nvGraphicFramePr>
+        <p:xfrm>
+          <a:off x="7181778" y="1301078"/>
+          <a:ext cx="4294676" cy="3997203"/>
+        </p:xfrm>
+        <a:graphic>
+          <a:graphicData uri="http://schemas.openxmlformats.org/presentationml/2006/ole">
+            <mc:AlternateContent xmlns:mc="http://schemas.openxmlformats.org/markup-compatibility/2006">
+              <mc:Choice xmlns:v="urn:schemas-microsoft-com:vml" Requires="v">
+                <p:oleObj spid="_x0000_s6151" name="Image" r:id="rId4" imgW="5294880" imgH="4926960" progId="Photoshop.Image.13">
+                  <p:embed/>
+                </p:oleObj>
+              </mc:Choice>
+              <mc:Fallback>
+                <p:oleObj name="Image" r:id="rId4" imgW="5294880" imgH="4926960" progId="Photoshop.Image.13">
+                  <p:embed/>
+                  <p:pic>
+                    <p:nvPicPr>
+                      <p:cNvPr id="0" name=""/>
+                      <p:cNvPicPr/>
+                      <p:nvPr/>
+                    </p:nvPicPr>
+                    <p:blipFill>
+                      <a:blip r:embed="rId5"/>
+                      <a:stretch>
+                        <a:fillRect/>
+                      </a:stretch>
+                    </p:blipFill>
+                    <p:spPr>
+                      <a:xfrm>
+                        <a:off x="7181778" y="1301078"/>
+                        <a:ext cx="4294676" cy="3997203"/>
+                      </a:xfrm>
+                      <a:prstGeom prst="rect">
+                        <a:avLst/>
+                      </a:prstGeom>
+                    </p:spPr>
+                  </p:pic>
+                </p:oleObj>
+              </mc:Fallback>
+            </mc:AlternateContent>
+          </a:graphicData>
+        </a:graphic>
+      </p:graphicFrame>
     </p:spTree>
     <p:extLst>
       <p:ext uri="{BB962C8B-B14F-4D97-AF65-F5344CB8AC3E}">
@@ -12968,7 +13208,7 @@
           <p:nvPr/>
         </p:nvPicPr>
         <p:blipFill rotWithShape="1">
-          <a:blip r:embed="rId3">
+          <a:blip r:embed="rId4">
             <a:extLst>
               <a:ext uri="{28A0092B-C50C-407E-A947-70E740481C1C}">
                 <a14:useLocalDpi xmlns:a14="http://schemas.microsoft.com/office/drawing/2010/main" val="0"/>
@@ -12982,41 +13222,6 @@
           <a:xfrm>
             <a:off x="879231" y="2257425"/>
             <a:ext cx="2897037" cy="2952750"/>
-          </a:xfrm>
-          <a:prstGeom prst="rect">
-            <a:avLst/>
-          </a:prstGeom>
-        </p:spPr>
-      </p:pic>
-      <p:pic>
-        <p:nvPicPr>
-          <p:cNvPr id="11" name="Picture 10">
-            <a:extLst>
-              <a:ext uri="{FF2B5EF4-FFF2-40B4-BE49-F238E27FC236}">
-                <a16:creationId xmlns:a16="http://schemas.microsoft.com/office/drawing/2014/main" id="{797E735B-0619-40D6-BEDA-A18C9F3F3962}"/>
-              </a:ext>
-            </a:extLst>
-          </p:cNvPr>
-          <p:cNvPicPr>
-            <a:picLocks noChangeAspect="1"/>
-          </p:cNvPicPr>
-          <p:nvPr/>
-        </p:nvPicPr>
-        <p:blipFill rotWithShape="1">
-          <a:blip r:embed="rId4">
-            <a:extLst>
-              <a:ext uri="{28A0092B-C50C-407E-A947-70E740481C1C}">
-                <a14:useLocalDpi xmlns:a14="http://schemas.microsoft.com/office/drawing/2010/main" val="0"/>
-              </a:ext>
-            </a:extLst>
-          </a:blip>
-          <a:srcRect l="18730" t="22748" r="38249" b="43234"/>
-          <a:stretch/>
-        </p:blipFill>
-        <p:spPr>
-          <a:xfrm>
-            <a:off x="8381283" y="2257425"/>
-            <a:ext cx="3523724" cy="2952750"/>
           </a:xfrm>
           <a:prstGeom prst="rect">
             <a:avLst/>
@@ -13058,6 +13263,69 @@
           </a:prstGeom>
         </p:spPr>
       </p:pic>
+      <p:graphicFrame>
+        <p:nvGraphicFramePr>
+          <p:cNvPr id="4" name="Object 3">
+            <a:extLst>
+              <a:ext uri="{FF2B5EF4-FFF2-40B4-BE49-F238E27FC236}">
+                <a16:creationId xmlns:a16="http://schemas.microsoft.com/office/drawing/2014/main" id="{4D6653B7-6288-4E88-9C91-22B37B7DD03F}"/>
+              </a:ext>
+            </a:extLst>
+          </p:cNvPr>
+          <p:cNvGraphicFramePr>
+            <a:graphicFrameLocks noChangeAspect="1"/>
+          </p:cNvGraphicFramePr>
+          <p:nvPr>
+            <p:extLst>
+              <p:ext uri="{D42A27DB-BD31-4B8C-83A1-F6EECF244321}">
+                <p14:modId xmlns:p14="http://schemas.microsoft.com/office/powerpoint/2010/main" val="1371424973"/>
+              </p:ext>
+            </p:extLst>
+          </p:nvPr>
+        </p:nvGraphicFramePr>
+        <p:xfrm>
+          <a:off x="8243854" y="2259271"/>
+          <a:ext cx="3522047" cy="2950904"/>
+        </p:xfrm>
+        <a:graphic>
+          <a:graphicData uri="http://schemas.openxmlformats.org/presentationml/2006/ole">
+            <mc:AlternateContent xmlns:mc="http://schemas.openxmlformats.org/markup-compatibility/2006">
+              <mc:Choice xmlns:v="urn:schemas-microsoft-com:vml" Requires="v">
+                <p:oleObj spid="_x0000_s7175" name="Image" r:id="rId6" imgW="4698360" imgH="3936240" progId="Photoshop.Image.13">
+                  <p:embed/>
+                </p:oleObj>
+              </mc:Choice>
+              <mc:Fallback>
+                <p:oleObj name="Image" r:id="rId6" imgW="4698360" imgH="3936240" progId="Photoshop.Image.13">
+                  <p:embed/>
+                  <p:pic>
+                    <p:nvPicPr>
+                      <p:cNvPr id="0" name=""/>
+                      <p:cNvPicPr/>
+                      <p:nvPr/>
+                    </p:nvPicPr>
+                    <p:blipFill>
+                      <a:blip r:embed="rId7"/>
+                      <a:stretch>
+                        <a:fillRect/>
+                      </a:stretch>
+                    </p:blipFill>
+                    <p:spPr>
+                      <a:xfrm>
+                        <a:off x="8243854" y="2259271"/>
+                        <a:ext cx="3522047" cy="2950904"/>
+                      </a:xfrm>
+                      <a:prstGeom prst="rect">
+                        <a:avLst/>
+                      </a:prstGeom>
+                    </p:spPr>
+                  </p:pic>
+                </p:oleObj>
+              </mc:Fallback>
+            </mc:AlternateContent>
+          </a:graphicData>
+        </a:graphic>
+      </p:graphicFrame>
     </p:spTree>
     <p:extLst>
       <p:ext uri="{BB962C8B-B14F-4D97-AF65-F5344CB8AC3E}">
@@ -15477,8 +15745,8 @@
         </p:nvSpPr>
         <p:spPr>
           <a:xfrm>
-            <a:off x="879231" y="1274885"/>
-            <a:ext cx="5502519" cy="4221040"/>
+            <a:off x="879231" y="2562434"/>
+            <a:ext cx="4942449" cy="1643399"/>
           </a:xfrm>
           <a:prstGeom prst="rect">
             <a:avLst/>
@@ -15497,16 +15765,14 @@
           <a:p>
             <a:r>
               <a:rPr lang="en-GB" dirty="0"/>
-              <a:t>Population data is considered when generating street maps. </a:t>
-            </a:r>
-          </a:p>
-          <a:p>
-            <a:pPr marL="0" indent="0">
-              <a:buNone/>
-            </a:pPr>
-            <a:r>
+              <a:t>Population data affects road density when generating a road network. </a:t>
+            </a:r>
+            <a:br>
               <a:rPr lang="en-GB" dirty="0"/>
-              <a:t>	(Sun, J. Yu, X. </a:t>
+            </a:br>
+            <a:r>
+              <a:rPr lang="en-GB" dirty="0"/>
+              <a:t>(Sun, J. Yu, X. </a:t>
             </a:r>
             <a:r>
               <a:rPr lang="en-GB" dirty="0" err="1"/>
@@ -15516,14 +15782,12 @@
               <a:rPr lang="en-GB" dirty="0"/>
               <a:t>, G. Green, M. 2002)</a:t>
             </a:r>
-          </a:p>
-          <a:p>
-            <a:pPr marL="0" indent="0">
-              <a:buNone/>
-            </a:pPr>
-            <a:r>
+            <a:br>
               <a:rPr lang="en-GB" dirty="0"/>
-              <a:t>	(Muller, P and Parish, Y, I, H. 2001).</a:t>
+            </a:br>
+            <a:r>
+              <a:rPr lang="en-GB" dirty="0"/>
+              <a:t>(Muller, P and Parish, Y, I, H. 2001).</a:t>
             </a:r>
           </a:p>
         </p:txBody>
@@ -15555,7 +15819,7 @@
         </p:blipFill>
         <p:spPr>
           <a:xfrm>
-            <a:off x="6920243" y="1277427"/>
+            <a:off x="6747523" y="1274884"/>
             <a:ext cx="4227196" cy="4218498"/>
           </a:xfrm>
           <a:prstGeom prst="rect">
@@ -16788,7 +17052,7 @@
             </a:r>
             <a:r>
               <a:rPr lang="en-GB" sz="1000" dirty="0">
-                <a:hlinkClick r:id="rId2"/>
+                <a:hlinkClick r:id="rId3"/>
               </a:rPr>
               <a:t>https://nccastaff.bournemouth.ac.uk/jmacey/MastersProjects/MSc09/Ilangovan/Thesis_i7834000.pdf</a:t>
             </a:r>
@@ -16971,41 +17235,69 @@
           </a:p>
         </p:txBody>
       </p:sp>
-      <p:pic>
-        <p:nvPicPr>
-          <p:cNvPr id="9" name="Picture 8">
+      <p:graphicFrame>
+        <p:nvGraphicFramePr>
+          <p:cNvPr id="3" name="Object 2">
             <a:extLst>
               <a:ext uri="{FF2B5EF4-FFF2-40B4-BE49-F238E27FC236}">
-                <a16:creationId xmlns:a16="http://schemas.microsoft.com/office/drawing/2014/main" id="{EC1FC889-DF9B-4E28-81FD-0AD5CEABC510}"/>
+                <a16:creationId xmlns:a16="http://schemas.microsoft.com/office/drawing/2014/main" id="{E31F08FA-A40C-4882-B7EB-4282241E16AE}"/>
               </a:ext>
             </a:extLst>
           </p:cNvPr>
-          <p:cNvPicPr>
-            <a:picLocks noChangeAspect="1"/>
-          </p:cNvPicPr>
-          <p:nvPr/>
-        </p:nvPicPr>
-        <p:blipFill rotWithShape="1">
-          <a:blip r:embed="rId3">
-            <a:extLst>
-              <a:ext uri="{28A0092B-C50C-407E-A947-70E740481C1C}">
-                <a14:useLocalDpi xmlns:a14="http://schemas.microsoft.com/office/drawing/2010/main" val="0"/>
-              </a:ext>
-            </a:extLst>
-          </a:blip>
-          <a:srcRect t="6022"/>
-          <a:stretch/>
-        </p:blipFill>
-        <p:spPr>
-          <a:xfrm>
-            <a:off x="7521891" y="1274885"/>
-            <a:ext cx="3614449" cy="3599813"/>
-          </a:xfrm>
-          <a:prstGeom prst="rect">
-            <a:avLst/>
-          </a:prstGeom>
-        </p:spPr>
-      </p:pic>
+          <p:cNvGraphicFramePr>
+            <a:graphicFrameLocks noChangeAspect="1"/>
+          </p:cNvGraphicFramePr>
+          <p:nvPr>
+            <p:extLst>
+              <p:ext uri="{D42A27DB-BD31-4B8C-83A1-F6EECF244321}">
+                <p14:modId xmlns:p14="http://schemas.microsoft.com/office/powerpoint/2010/main" val="1889273927"/>
+              </p:ext>
+            </p:extLst>
+          </p:nvPr>
+        </p:nvGraphicFramePr>
+        <p:xfrm>
+          <a:off x="7569405" y="1274885"/>
+          <a:ext cx="3513084" cy="3601915"/>
+        </p:xfrm>
+        <a:graphic>
+          <a:graphicData uri="http://schemas.openxmlformats.org/presentationml/2006/ole">
+            <mc:AlternateContent xmlns:mc="http://schemas.openxmlformats.org/markup-compatibility/2006">
+              <mc:Choice xmlns:v="urn:schemas-microsoft-com:vml" Requires="v">
+                <p:oleObj spid="_x0000_s8196" name="Image" r:id="rId4" imgW="4583880" imgH="4698360" progId="Photoshop.Image.13">
+                  <p:embed/>
+                </p:oleObj>
+              </mc:Choice>
+              <mc:Fallback>
+                <p:oleObj name="Image" r:id="rId4" imgW="4583880" imgH="4698360" progId="Photoshop.Image.13">
+                  <p:embed/>
+                  <p:pic>
+                    <p:nvPicPr>
+                      <p:cNvPr id="0" name=""/>
+                      <p:cNvPicPr/>
+                      <p:nvPr/>
+                    </p:nvPicPr>
+                    <p:blipFill>
+                      <a:blip r:embed="rId5"/>
+                      <a:stretch>
+                        <a:fillRect/>
+                      </a:stretch>
+                    </p:blipFill>
+                    <p:spPr>
+                      <a:xfrm>
+                        <a:off x="7569405" y="1274885"/>
+                        <a:ext cx="3513084" cy="3601915"/>
+                      </a:xfrm>
+                      <a:prstGeom prst="rect">
+                        <a:avLst/>
+                      </a:prstGeom>
+                    </p:spPr>
+                  </p:pic>
+                </p:oleObj>
+              </mc:Fallback>
+            </mc:AlternateContent>
+          </a:graphicData>
+        </a:graphic>
+      </p:graphicFrame>
     </p:spTree>
     <p:extLst>
       <p:ext uri="{BB962C8B-B14F-4D97-AF65-F5344CB8AC3E}">

</xml_diff>